<commit_message>
Update presentation 'Building a Language' - ADNUG October 2012 - Improve diagrams of Scope objects as a linked list rather than a spaghetti stack.
</commit_message>
<xml_diff>
--- a/BuildingALanguage/BuildingALanguage.pptx
+++ b/BuildingALanguage/BuildingALanguage.pptx
@@ -307,7 +307,7 @@
             <a:fld id="{1D8BD707-D9CF-40AE-B4C6-C98DA3205C09}" type="datetimeFigureOut">
               <a:rPr lang="en-US" smtClean="0"/>
               <a:pPr/>
-              <a:t>10/3/2012</a:t>
+              <a:t>10/7/2012</a:t>
             </a:fld>
             <a:endParaRPr lang="en-US"/>
           </a:p>
@@ -474,7 +474,7 @@
             <a:fld id="{1D8BD707-D9CF-40AE-B4C6-C98DA3205C09}" type="datetimeFigureOut">
               <a:rPr lang="en-US" smtClean="0"/>
               <a:pPr/>
-              <a:t>10/3/2012</a:t>
+              <a:t>10/7/2012</a:t>
             </a:fld>
             <a:endParaRPr lang="en-US"/>
           </a:p>
@@ -651,7 +651,7 @@
             <a:fld id="{1D8BD707-D9CF-40AE-B4C6-C98DA3205C09}" type="datetimeFigureOut">
               <a:rPr lang="en-US" smtClean="0"/>
               <a:pPr/>
-              <a:t>10/3/2012</a:t>
+              <a:t>10/7/2012</a:t>
             </a:fld>
             <a:endParaRPr lang="en-US"/>
           </a:p>
@@ -818,7 +818,7 @@
             <a:fld id="{1D8BD707-D9CF-40AE-B4C6-C98DA3205C09}" type="datetimeFigureOut">
               <a:rPr lang="en-US" smtClean="0"/>
               <a:pPr/>
-              <a:t>10/3/2012</a:t>
+              <a:t>10/7/2012</a:t>
             </a:fld>
             <a:endParaRPr lang="en-US"/>
           </a:p>
@@ -1061,7 +1061,7 @@
             <a:fld id="{1D8BD707-D9CF-40AE-B4C6-C98DA3205C09}" type="datetimeFigureOut">
               <a:rPr lang="en-US" smtClean="0"/>
               <a:pPr/>
-              <a:t>10/3/2012</a:t>
+              <a:t>10/7/2012</a:t>
             </a:fld>
             <a:endParaRPr lang="en-US"/>
           </a:p>
@@ -1346,7 +1346,7 @@
             <a:fld id="{1D8BD707-D9CF-40AE-B4C6-C98DA3205C09}" type="datetimeFigureOut">
               <a:rPr lang="en-US" smtClean="0"/>
               <a:pPr/>
-              <a:t>10/3/2012</a:t>
+              <a:t>10/7/2012</a:t>
             </a:fld>
             <a:endParaRPr lang="en-US"/>
           </a:p>
@@ -1765,7 +1765,7 @@
             <a:fld id="{1D8BD707-D9CF-40AE-B4C6-C98DA3205C09}" type="datetimeFigureOut">
               <a:rPr lang="en-US" smtClean="0"/>
               <a:pPr/>
-              <a:t>10/3/2012</a:t>
+              <a:t>10/7/2012</a:t>
             </a:fld>
             <a:endParaRPr lang="en-US"/>
           </a:p>
@@ -1880,7 +1880,7 @@
             <a:fld id="{1D8BD707-D9CF-40AE-B4C6-C98DA3205C09}" type="datetimeFigureOut">
               <a:rPr lang="en-US" smtClean="0"/>
               <a:pPr/>
-              <a:t>10/3/2012</a:t>
+              <a:t>10/7/2012</a:t>
             </a:fld>
             <a:endParaRPr lang="en-US"/>
           </a:p>
@@ -1972,7 +1972,7 @@
             <a:fld id="{1D8BD707-D9CF-40AE-B4C6-C98DA3205C09}" type="datetimeFigureOut">
               <a:rPr lang="en-US" smtClean="0"/>
               <a:pPr/>
-              <a:t>10/3/2012</a:t>
+              <a:t>10/7/2012</a:t>
             </a:fld>
             <a:endParaRPr lang="en-US"/>
           </a:p>
@@ -2246,7 +2246,7 @@
             <a:fld id="{1D8BD707-D9CF-40AE-B4C6-C98DA3205C09}" type="datetimeFigureOut">
               <a:rPr lang="en-US" smtClean="0"/>
               <a:pPr/>
-              <a:t>10/3/2012</a:t>
+              <a:t>10/7/2012</a:t>
             </a:fld>
             <a:endParaRPr lang="en-US"/>
           </a:p>
@@ -2496,7 +2496,7 @@
             <a:fld id="{1D8BD707-D9CF-40AE-B4C6-C98DA3205C09}" type="datetimeFigureOut">
               <a:rPr lang="en-US" smtClean="0"/>
               <a:pPr/>
-              <a:t>10/3/2012</a:t>
+              <a:t>10/7/2012</a:t>
             </a:fld>
             <a:endParaRPr lang="en-US"/>
           </a:p>
@@ -2706,7 +2706,7 @@
             <a:fld id="{1D8BD707-D9CF-40AE-B4C6-C98DA3205C09}" type="datetimeFigureOut">
               <a:rPr lang="en-US" smtClean="0"/>
               <a:pPr/>
-              <a:t>10/3/2012</a:t>
+              <a:t>10/7/2012</a:t>
             </a:fld>
             <a:endParaRPr lang="en-US"/>
           </a:p>
@@ -3134,7 +3134,23 @@
                   <a:schemeClr val="tx1"/>
                 </a:solidFill>
               </a:rPr>
-              <a:t>, Parsing, Spaghetti Stacks, and </a:t>
+              <a:t>, Parsing, </a:t>
+            </a:r>
+            <a:r>
+              <a:rPr lang="en-US" dirty="0" smtClean="0">
+                <a:solidFill>
+                  <a:schemeClr val="tx1"/>
+                </a:solidFill>
+              </a:rPr>
+              <a:t>Type Checking, </a:t>
+            </a:r>
+            <a:r>
+              <a:rPr lang="en-US" dirty="0" smtClean="0">
+                <a:solidFill>
+                  <a:schemeClr val="tx1"/>
+                </a:solidFill>
+              </a:rPr>
+              <a:t>and </a:t>
             </a:r>
             <a:r>
               <a:rPr lang="en-US" dirty="0" err="1" smtClean="0">
@@ -3143,14 +3159,6 @@
                 </a:solidFill>
               </a:rPr>
               <a:t>Transpilation</a:t>
-            </a:r>
-            <a:r>
-              <a:rPr lang="en-US" dirty="0" smtClean="0">
-                <a:solidFill>
-                  <a:schemeClr val="tx1"/>
-                </a:solidFill>
-              </a:rPr>
-              <a:t>… all of which are, in fact, things.</a:t>
             </a:r>
             <a:endParaRPr lang="en-US" dirty="0">
               <a:solidFill>
@@ -4663,281 +4671,6 @@
       </p:sp>
       <p:grpSp>
         <p:nvGrpSpPr>
-          <p:cNvPr id="7" name="Group 6"/>
-          <p:cNvGrpSpPr/>
-          <p:nvPr/>
-        </p:nvGrpSpPr>
-        <p:grpSpPr>
-          <a:xfrm>
-            <a:off x="6705600" y="3166102"/>
-            <a:ext cx="1600200" cy="1981200"/>
-            <a:chOff x="2438400" y="3657600"/>
-            <a:chExt cx="1600200" cy="1981200"/>
-          </a:xfrm>
-        </p:grpSpPr>
-        <p:grpSp>
-          <p:nvGrpSpPr>
-            <p:cNvPr id="3" name="Group 2"/>
-            <p:cNvGrpSpPr/>
-            <p:nvPr/>
-          </p:nvGrpSpPr>
-          <p:grpSpPr>
-            <a:xfrm>
-              <a:off x="2438400" y="3657600"/>
-              <a:ext cx="1600200" cy="1981200"/>
-              <a:chOff x="2438400" y="3657600"/>
-              <a:chExt cx="1600200" cy="1981200"/>
-            </a:xfrm>
-          </p:grpSpPr>
-          <p:sp>
-            <p:nvSpPr>
-              <p:cNvPr id="42" name="Rectangle 41"/>
-              <p:cNvSpPr/>
-              <p:nvPr/>
-            </p:nvSpPr>
-            <p:spPr>
-              <a:xfrm>
-                <a:off x="2438400" y="3657600"/>
-                <a:ext cx="1600200" cy="1981200"/>
-              </a:xfrm>
-              <a:prstGeom prst="rect">
-                <a:avLst/>
-              </a:prstGeom>
-              <a:solidFill>
-                <a:schemeClr val="bg1"/>
-              </a:solidFill>
-            </p:spPr>
-            <p:style>
-              <a:lnRef idx="2">
-                <a:schemeClr val="accent1">
-                  <a:shade val="50000"/>
-                </a:schemeClr>
-              </a:lnRef>
-              <a:fillRef idx="1">
-                <a:schemeClr val="accent1"/>
-              </a:fillRef>
-              <a:effectRef idx="0">
-                <a:schemeClr val="accent1"/>
-              </a:effectRef>
-              <a:fontRef idx="minor">
-                <a:schemeClr val="lt1"/>
-              </a:fontRef>
-            </p:style>
-            <p:txBody>
-              <a:bodyPr rtlCol="0" anchor="ctr"/>
-              <a:lstStyle/>
-              <a:p>
-                <a:endParaRPr lang="en-US" dirty="0" smtClean="0">
-                  <a:solidFill>
-                    <a:schemeClr val="tx1"/>
-                  </a:solidFill>
-                </a:endParaRPr>
-              </a:p>
-            </p:txBody>
-          </p:sp>
-          <p:grpSp>
-            <p:nvGrpSpPr>
-              <p:cNvPr id="43" name="Group 42"/>
-              <p:cNvGrpSpPr/>
-              <p:nvPr/>
-            </p:nvGrpSpPr>
-            <p:grpSpPr>
-              <a:xfrm>
-                <a:off x="2590800" y="4114800"/>
-                <a:ext cx="1447800" cy="1447800"/>
-                <a:chOff x="2590800" y="5013793"/>
-                <a:chExt cx="1447800" cy="1447800"/>
-              </a:xfrm>
-            </p:grpSpPr>
-            <p:sp>
-              <p:nvSpPr>
-                <p:cNvPr id="35" name="TextBox 34"/>
-                <p:cNvSpPr txBox="1"/>
-                <p:nvPr/>
-              </p:nvSpPr>
-              <p:spPr>
-                <a:xfrm>
-                  <a:off x="2590800" y="5013793"/>
-                  <a:ext cx="1447800" cy="369332"/>
-                </a:xfrm>
-                <a:prstGeom prst="rect">
-                  <a:avLst/>
-                </a:prstGeom>
-                <a:noFill/>
-              </p:spPr>
-              <p:txBody>
-                <a:bodyPr wrap="square" rtlCol="0">
-                  <a:spAutoFit/>
-                </a:bodyPr>
-                <a:lstStyle/>
-                <a:p>
-                  <a:r>
-                    <a:rPr lang="en-US" dirty="0" smtClean="0"/>
-                    <a:t>{ “y” : </a:t>
-                  </a:r>
-                  <a:r>
-                    <a:rPr lang="en-US" dirty="0" err="1" smtClean="0"/>
-                    <a:t>int</a:t>
-                  </a:r>
-                  <a:r>
-                    <a:rPr lang="en-US" dirty="0" smtClean="0"/>
-                    <a:t> }</a:t>
-                  </a:r>
-                  <a:endParaRPr lang="en-US" dirty="0"/>
-                </a:p>
-              </p:txBody>
-            </p:sp>
-            <p:sp>
-              <p:nvSpPr>
-                <p:cNvPr id="36" name="TextBox 35"/>
-                <p:cNvSpPr txBox="1"/>
-                <p:nvPr/>
-              </p:nvSpPr>
-              <p:spPr>
-                <a:xfrm>
-                  <a:off x="2590800" y="5815262"/>
-                  <a:ext cx="1447800" cy="646331"/>
-                </a:xfrm>
-                <a:prstGeom prst="rect">
-                  <a:avLst/>
-                </a:prstGeom>
-                <a:noFill/>
-              </p:spPr>
-              <p:txBody>
-                <a:bodyPr wrap="square" rtlCol="0">
-                  <a:spAutoFit/>
-                </a:bodyPr>
-                <a:lstStyle/>
-                <a:p>
-                  <a:r>
-                    <a:rPr lang="en-US" dirty="0" smtClean="0"/>
-                    <a:t>{ “x” : </a:t>
-                  </a:r>
-                  <a:r>
-                    <a:rPr lang="en-US" dirty="0" err="1" smtClean="0"/>
-                    <a:t>int</a:t>
-                  </a:r>
-                  <a:r>
-                    <a:rPr lang="en-US" dirty="0" smtClean="0"/>
-                    <a:t>,</a:t>
-                  </a:r>
-                </a:p>
-                <a:p>
-                  <a:r>
-                    <a:rPr lang="en-US" dirty="0" smtClean="0"/>
-                    <a:t>  “</a:t>
-                  </a:r>
-                  <a:r>
-                    <a:rPr lang="en-US" dirty="0"/>
-                    <a:t>y” : </a:t>
-                  </a:r>
-                  <a:r>
-                    <a:rPr lang="en-US" dirty="0" err="1"/>
-                    <a:t>bool</a:t>
-                  </a:r>
-                  <a:r>
-                    <a:rPr lang="en-US" dirty="0" smtClean="0"/>
-                    <a:t> }</a:t>
-                  </a:r>
-                  <a:endParaRPr lang="en-US" dirty="0"/>
-                </a:p>
-              </p:txBody>
-            </p:sp>
-            <p:cxnSp>
-              <p:nvCxnSpPr>
-                <p:cNvPr id="39" name="Straight Connector 38"/>
-                <p:cNvCxnSpPr>
-                  <a:stCxn id="35" idx="2"/>
-                  <a:endCxn id="36" idx="0"/>
-                </p:cNvCxnSpPr>
-                <p:nvPr/>
-              </p:nvCxnSpPr>
-              <p:spPr>
-                <a:xfrm>
-                  <a:off x="3314700" y="5383125"/>
-                  <a:ext cx="0" cy="432137"/>
-                </a:xfrm>
-                <a:prstGeom prst="line">
-                  <a:avLst/>
-                </a:prstGeom>
-                <a:ln w="28575">
-                  <a:solidFill>
-                    <a:schemeClr val="accent1">
-                      <a:lumMod val="75000"/>
-                    </a:schemeClr>
-                  </a:solidFill>
-                  <a:tailEnd type="triangle"/>
-                </a:ln>
-              </p:spPr>
-              <p:style>
-                <a:lnRef idx="1">
-                  <a:schemeClr val="accent1"/>
-                </a:lnRef>
-                <a:fillRef idx="0">
-                  <a:schemeClr val="accent1"/>
-                </a:fillRef>
-                <a:effectRef idx="0">
-                  <a:schemeClr val="accent1"/>
-                </a:effectRef>
-                <a:fontRef idx="minor">
-                  <a:schemeClr val="tx1"/>
-                </a:fontRef>
-              </p:style>
-            </p:cxnSp>
-          </p:grpSp>
-        </p:grpSp>
-        <p:sp>
-          <p:nvSpPr>
-            <p:cNvPr id="24" name="Rectangle 23"/>
-            <p:cNvSpPr/>
-            <p:nvPr/>
-          </p:nvSpPr>
-          <p:spPr>
-            <a:xfrm>
-              <a:off x="3238500" y="3657600"/>
-              <a:ext cx="800100" cy="272566"/>
-            </a:xfrm>
-            <a:prstGeom prst="rect">
-              <a:avLst/>
-            </a:prstGeom>
-            <a:solidFill>
-              <a:schemeClr val="bg1"/>
-            </a:solidFill>
-          </p:spPr>
-          <p:style>
-            <a:lnRef idx="2">
-              <a:schemeClr val="accent1">
-                <a:shade val="50000"/>
-              </a:schemeClr>
-            </a:lnRef>
-            <a:fillRef idx="1">
-              <a:schemeClr val="accent1"/>
-            </a:fillRef>
-            <a:effectRef idx="0">
-              <a:schemeClr val="accent1"/>
-            </a:effectRef>
-            <a:fontRef idx="minor">
-              <a:schemeClr val="lt1"/>
-            </a:fontRef>
-          </p:style>
-          <p:txBody>
-            <a:bodyPr rtlCol="0" anchor="ctr"/>
-            <a:lstStyle/>
-            <a:p>
-              <a:r>
-                <a:rPr lang="en-US" dirty="0" smtClean="0">
-                  <a:solidFill>
-                    <a:schemeClr val="tx1"/>
-                  </a:solidFill>
-                </a:rPr>
-                <a:t>Scope</a:t>
-              </a:r>
-            </a:p>
-          </p:txBody>
-        </p:sp>
-      </p:grpSp>
-      <p:grpSp>
-        <p:nvGrpSpPr>
           <p:cNvPr id="25" name="Group 24"/>
           <p:cNvGrpSpPr/>
           <p:nvPr/>
@@ -5207,12 +4940,12 @@
         </p:nvCxnSpPr>
         <p:spPr>
           <a:xfrm rot="16200000" flipV="1">
-            <a:off x="5941699" y="1602101"/>
-            <a:ext cx="41902" cy="3086100"/>
+            <a:off x="5934075" y="1609725"/>
+            <a:ext cx="76200" cy="3105150"/>
           </a:xfrm>
           <a:prstGeom prst="curvedConnector3">
             <a:avLst>
-              <a:gd name="adj1" fmla="val 1942547"/>
+              <a:gd name="adj1" fmla="val 1477778"/>
             </a:avLst>
           </a:prstGeom>
           <a:ln w="28575">
@@ -5522,6 +5255,423 @@
           </a:p>
         </p:txBody>
       </p:sp>
+      <p:grpSp>
+        <p:nvGrpSpPr>
+          <p:cNvPr id="11" name="Group 10"/>
+          <p:cNvGrpSpPr/>
+          <p:nvPr/>
+        </p:nvGrpSpPr>
+        <p:grpSpPr>
+          <a:xfrm>
+            <a:off x="6248400" y="3200400"/>
+            <a:ext cx="2552700" cy="2091698"/>
+            <a:chOff x="6248400" y="3200400"/>
+            <a:chExt cx="2552700" cy="2091698"/>
+          </a:xfrm>
+        </p:grpSpPr>
+        <p:grpSp>
+          <p:nvGrpSpPr>
+            <p:cNvPr id="7" name="Group 6"/>
+            <p:cNvGrpSpPr/>
+            <p:nvPr/>
+          </p:nvGrpSpPr>
+          <p:grpSpPr>
+            <a:xfrm>
+              <a:off x="6248400" y="3200400"/>
+              <a:ext cx="2552700" cy="2091698"/>
+              <a:chOff x="2438400" y="3657600"/>
+              <a:chExt cx="1600200" cy="1981200"/>
+            </a:xfrm>
+          </p:grpSpPr>
+          <p:sp>
+            <p:nvSpPr>
+              <p:cNvPr id="42" name="Rectangle 41"/>
+              <p:cNvSpPr/>
+              <p:nvPr/>
+            </p:nvSpPr>
+            <p:spPr>
+              <a:xfrm>
+                <a:off x="2438400" y="3657600"/>
+                <a:ext cx="1600200" cy="1981200"/>
+              </a:xfrm>
+              <a:prstGeom prst="rect">
+                <a:avLst/>
+              </a:prstGeom>
+              <a:solidFill>
+                <a:schemeClr val="bg1"/>
+              </a:solidFill>
+            </p:spPr>
+            <p:style>
+              <a:lnRef idx="2">
+                <a:schemeClr val="accent1">
+                  <a:shade val="50000"/>
+                </a:schemeClr>
+              </a:lnRef>
+              <a:fillRef idx="1">
+                <a:schemeClr val="accent1"/>
+              </a:fillRef>
+              <a:effectRef idx="0">
+                <a:schemeClr val="accent1"/>
+              </a:effectRef>
+              <a:fontRef idx="minor">
+                <a:schemeClr val="lt1"/>
+              </a:fontRef>
+            </p:style>
+            <p:txBody>
+              <a:bodyPr rtlCol="0" anchor="ctr"/>
+              <a:lstStyle/>
+              <a:p>
+                <a:endParaRPr lang="en-US" dirty="0" smtClean="0">
+                  <a:solidFill>
+                    <a:schemeClr val="tx1"/>
+                  </a:solidFill>
+                </a:endParaRPr>
+              </a:p>
+            </p:txBody>
+          </p:sp>
+          <p:sp>
+            <p:nvSpPr>
+              <p:cNvPr id="24" name="Rectangle 23"/>
+              <p:cNvSpPr/>
+              <p:nvPr/>
+            </p:nvSpPr>
+            <p:spPr>
+              <a:xfrm>
+                <a:off x="3518210" y="3657600"/>
+                <a:ext cx="520390" cy="272566"/>
+              </a:xfrm>
+              <a:prstGeom prst="rect">
+                <a:avLst/>
+              </a:prstGeom>
+              <a:solidFill>
+                <a:schemeClr val="bg1"/>
+              </a:solidFill>
+            </p:spPr>
+            <p:style>
+              <a:lnRef idx="2">
+                <a:schemeClr val="accent1">
+                  <a:shade val="50000"/>
+                </a:schemeClr>
+              </a:lnRef>
+              <a:fillRef idx="1">
+                <a:schemeClr val="accent1"/>
+              </a:fillRef>
+              <a:effectRef idx="0">
+                <a:schemeClr val="accent1"/>
+              </a:effectRef>
+              <a:fontRef idx="minor">
+                <a:schemeClr val="lt1"/>
+              </a:fontRef>
+            </p:style>
+            <p:txBody>
+              <a:bodyPr rtlCol="0" anchor="ctr"/>
+              <a:lstStyle/>
+              <a:p>
+                <a:r>
+                  <a:rPr lang="en-US" dirty="0" smtClean="0">
+                    <a:solidFill>
+                      <a:schemeClr val="tx1"/>
+                    </a:solidFill>
+                  </a:rPr>
+                  <a:t>Scope</a:t>
+                </a:r>
+                <a:endParaRPr lang="en-US" dirty="0" smtClean="0">
+                  <a:solidFill>
+                    <a:schemeClr val="tx1"/>
+                  </a:solidFill>
+                </a:endParaRPr>
+              </a:p>
+            </p:txBody>
+          </p:sp>
+        </p:grpSp>
+        <p:sp>
+          <p:nvSpPr>
+            <p:cNvPr id="2" name="Rectangle 1"/>
+            <p:cNvSpPr/>
+            <p:nvPr/>
+          </p:nvSpPr>
+          <p:spPr>
+            <a:xfrm>
+              <a:off x="7086600" y="3810000"/>
+              <a:ext cx="838200" cy="609600"/>
+            </a:xfrm>
+            <a:prstGeom prst="rect">
+              <a:avLst/>
+            </a:prstGeom>
+            <a:solidFill>
+              <a:schemeClr val="bg1"/>
+            </a:solidFill>
+          </p:spPr>
+          <p:style>
+            <a:lnRef idx="2">
+              <a:schemeClr val="accent1">
+                <a:shade val="50000"/>
+              </a:schemeClr>
+            </a:lnRef>
+            <a:fillRef idx="1">
+              <a:schemeClr val="accent1"/>
+            </a:fillRef>
+            <a:effectRef idx="0">
+              <a:schemeClr val="accent1"/>
+            </a:effectRef>
+            <a:fontRef idx="minor">
+              <a:schemeClr val="lt1"/>
+            </a:fontRef>
+          </p:style>
+          <p:txBody>
+            <a:bodyPr rtlCol="0" anchor="ctr"/>
+            <a:lstStyle/>
+            <a:p>
+              <a:pPr algn="ctr"/>
+              <a:r>
+                <a:rPr lang="en-US" dirty="0" smtClean="0">
+                  <a:solidFill>
+                    <a:schemeClr val="tx1"/>
+                  </a:solidFill>
+                </a:rPr>
+                <a:t>x: </a:t>
+              </a:r>
+              <a:r>
+                <a:rPr lang="en-US" dirty="0" err="1" smtClean="0">
+                  <a:solidFill>
+                    <a:schemeClr val="tx1"/>
+                  </a:solidFill>
+                </a:rPr>
+                <a:t>int</a:t>
+              </a:r>
+              <a:endParaRPr lang="en-US" dirty="0" smtClean="0">
+                <a:solidFill>
+                  <a:schemeClr val="tx1"/>
+                </a:solidFill>
+              </a:endParaRPr>
+            </a:p>
+            <a:p>
+              <a:pPr algn="ctr"/>
+              <a:r>
+                <a:rPr lang="en-US" dirty="0" smtClean="0">
+                  <a:solidFill>
+                    <a:schemeClr val="tx1"/>
+                  </a:solidFill>
+                </a:rPr>
+                <a:t>y: </a:t>
+              </a:r>
+              <a:r>
+                <a:rPr lang="en-US" dirty="0" err="1" smtClean="0">
+                  <a:solidFill>
+                    <a:schemeClr val="tx1"/>
+                  </a:solidFill>
+                </a:rPr>
+                <a:t>bool</a:t>
+              </a:r>
+              <a:endParaRPr lang="en-US" dirty="0">
+                <a:solidFill>
+                  <a:schemeClr val="tx1"/>
+                </a:solidFill>
+              </a:endParaRPr>
+            </a:p>
+          </p:txBody>
+        </p:sp>
+        <p:sp>
+          <p:nvSpPr>
+            <p:cNvPr id="27" name="Rectangle 26"/>
+            <p:cNvSpPr/>
+            <p:nvPr/>
+          </p:nvSpPr>
+          <p:spPr>
+            <a:xfrm>
+              <a:off x="7848600" y="4572000"/>
+              <a:ext cx="838200" cy="609600"/>
+            </a:xfrm>
+            <a:prstGeom prst="rect">
+              <a:avLst/>
+            </a:prstGeom>
+            <a:solidFill>
+              <a:schemeClr val="bg1"/>
+            </a:solidFill>
+          </p:spPr>
+          <p:style>
+            <a:lnRef idx="2">
+              <a:schemeClr val="accent1">
+                <a:shade val="50000"/>
+              </a:schemeClr>
+            </a:lnRef>
+            <a:fillRef idx="1">
+              <a:schemeClr val="accent1"/>
+            </a:fillRef>
+            <a:effectRef idx="0">
+              <a:schemeClr val="accent1"/>
+            </a:effectRef>
+            <a:fontRef idx="minor">
+              <a:schemeClr val="lt1"/>
+            </a:fontRef>
+          </p:style>
+          <p:txBody>
+            <a:bodyPr rtlCol="0" anchor="ctr"/>
+            <a:lstStyle/>
+            <a:p>
+              <a:pPr algn="ctr"/>
+              <a:r>
+                <a:rPr lang="en-US" dirty="0" smtClean="0">
+                  <a:solidFill>
+                    <a:schemeClr val="tx1"/>
+                  </a:solidFill>
+                </a:rPr>
+                <a:t>y: </a:t>
+              </a:r>
+              <a:r>
+                <a:rPr lang="en-US" dirty="0" err="1" smtClean="0">
+                  <a:solidFill>
+                    <a:schemeClr val="tx1"/>
+                  </a:solidFill>
+                </a:rPr>
+                <a:t>int</a:t>
+              </a:r>
+              <a:endParaRPr lang="en-US" dirty="0">
+                <a:solidFill>
+                  <a:schemeClr val="tx1"/>
+                </a:solidFill>
+              </a:endParaRPr>
+            </a:p>
+          </p:txBody>
+        </p:sp>
+        <p:cxnSp>
+          <p:nvCxnSpPr>
+            <p:cNvPr id="29" name="Straight Connector 28"/>
+            <p:cNvCxnSpPr>
+              <a:stCxn id="27" idx="1"/>
+              <a:endCxn id="2" idx="2"/>
+            </p:cNvCxnSpPr>
+            <p:nvPr/>
+          </p:nvCxnSpPr>
+          <p:spPr>
+            <a:xfrm rot="10800000">
+              <a:off x="7505700" y="4419600"/>
+              <a:ext cx="342900" cy="457200"/>
+            </a:xfrm>
+            <a:prstGeom prst="curvedConnector2">
+              <a:avLst/>
+            </a:prstGeom>
+            <a:ln w="28575">
+              <a:solidFill>
+                <a:schemeClr val="accent1">
+                  <a:lumMod val="75000"/>
+                </a:schemeClr>
+              </a:solidFill>
+              <a:tailEnd type="triangle"/>
+            </a:ln>
+          </p:spPr>
+          <p:style>
+            <a:lnRef idx="1">
+              <a:schemeClr val="accent1"/>
+            </a:lnRef>
+            <a:fillRef idx="0">
+              <a:schemeClr val="accent1"/>
+            </a:fillRef>
+            <a:effectRef idx="0">
+              <a:schemeClr val="accent1"/>
+            </a:effectRef>
+            <a:fontRef idx="minor">
+              <a:schemeClr val="tx1"/>
+            </a:fontRef>
+          </p:style>
+        </p:cxnSp>
+        <p:sp>
+          <p:nvSpPr>
+            <p:cNvPr id="30" name="Rectangle 29"/>
+            <p:cNvSpPr/>
+            <p:nvPr/>
+          </p:nvSpPr>
+          <p:spPr>
+            <a:xfrm>
+              <a:off x="6324600" y="3302167"/>
+              <a:ext cx="838200" cy="355433"/>
+            </a:xfrm>
+            <a:prstGeom prst="rect">
+              <a:avLst/>
+            </a:prstGeom>
+            <a:solidFill>
+              <a:schemeClr val="bg1"/>
+            </a:solidFill>
+          </p:spPr>
+          <p:style>
+            <a:lnRef idx="2">
+              <a:schemeClr val="accent1">
+                <a:shade val="50000"/>
+              </a:schemeClr>
+            </a:lnRef>
+            <a:fillRef idx="1">
+              <a:schemeClr val="accent1"/>
+            </a:fillRef>
+            <a:effectRef idx="0">
+              <a:schemeClr val="accent1"/>
+            </a:effectRef>
+            <a:fontRef idx="minor">
+              <a:schemeClr val="lt1"/>
+            </a:fontRef>
+          </p:style>
+          <p:txBody>
+            <a:bodyPr rtlCol="0" anchor="ctr"/>
+            <a:lstStyle/>
+            <a:p>
+              <a:pPr algn="ctr"/>
+              <a:r>
+                <a:rPr lang="en-US" dirty="0" err="1" smtClean="0">
+                  <a:solidFill>
+                    <a:schemeClr val="tx1"/>
+                  </a:solidFill>
+                </a:rPr>
+                <a:t>globals</a:t>
+              </a:r>
+              <a:endParaRPr lang="en-US" dirty="0">
+                <a:solidFill>
+                  <a:schemeClr val="tx1"/>
+                </a:solidFill>
+              </a:endParaRPr>
+            </a:p>
+          </p:txBody>
+        </p:sp>
+        <p:cxnSp>
+          <p:nvCxnSpPr>
+            <p:cNvPr id="31" name="Straight Connector 28"/>
+            <p:cNvCxnSpPr>
+              <a:stCxn id="2" idx="1"/>
+              <a:endCxn id="30" idx="2"/>
+            </p:cNvCxnSpPr>
+            <p:nvPr/>
+          </p:nvCxnSpPr>
+          <p:spPr>
+            <a:xfrm rot="10800000">
+              <a:off x="6743700" y="3657600"/>
+              <a:ext cx="342900" cy="457200"/>
+            </a:xfrm>
+            <a:prstGeom prst="curvedConnector2">
+              <a:avLst/>
+            </a:prstGeom>
+            <a:ln w="28575">
+              <a:solidFill>
+                <a:schemeClr val="accent1">
+                  <a:lumMod val="75000"/>
+                </a:schemeClr>
+              </a:solidFill>
+              <a:tailEnd type="triangle"/>
+            </a:ln>
+          </p:spPr>
+          <p:style>
+            <a:lnRef idx="1">
+              <a:schemeClr val="accent1"/>
+            </a:lnRef>
+            <a:fillRef idx="0">
+              <a:schemeClr val="accent1"/>
+            </a:fillRef>
+            <a:effectRef idx="0">
+              <a:schemeClr val="accent1"/>
+            </a:effectRef>
+            <a:fontRef idx="minor">
+              <a:schemeClr val="tx1"/>
+            </a:fontRef>
+          </p:style>
+        </p:cxnSp>
+      </p:grpSp>
     </p:spTree>
     <p:extLst>
       <p:ext uri="{BB962C8B-B14F-4D97-AF65-F5344CB8AC3E}">
@@ -5561,7 +5711,7 @@
                             </p:stCondLst>
                             <p:childTnLst>
                               <p:par>
-                                <p:cTn id="5" presetID="1" presetClass="entr" presetSubtype="0" fill="hold" nodeType="clickEffect">
+                                <p:cTn id="5" presetID="1" presetClass="entr" presetSubtype="0" fill="hold" grpId="0" nodeType="clickEffect">
                                   <p:stCondLst>
                                     <p:cond delay="0"/>
                                   </p:stCondLst>
@@ -5574,7 +5724,7 @@
                                           </p:stCondLst>
                                         </p:cTn>
                                         <p:tgtEl>
-                                          <p:spTgt spid="25"/>
+                                          <p:spTgt spid="33"/>
                                         </p:tgtEl>
                                         <p:attrNameLst>
                                           <p:attrName>style.visibility</p:attrName>
@@ -5619,7 +5769,7 @@
                                           </p:stCondLst>
                                         </p:cTn>
                                         <p:tgtEl>
-                                          <p:spTgt spid="7"/>
+                                          <p:spTgt spid="25"/>
                                         </p:tgtEl>
                                         <p:attrNameLst>
                                           <p:attrName>style.visibility</p:attrName>
@@ -5664,7 +5814,7 @@
                                           </p:stCondLst>
                                         </p:cTn>
                                         <p:tgtEl>
-                                          <p:spTgt spid="45"/>
+                                          <p:spTgt spid="11"/>
                                         </p:tgtEl>
                                         <p:attrNameLst>
                                           <p:attrName>style.visibility</p:attrName>
@@ -5709,6 +5859,51 @@
                                           </p:stCondLst>
                                         </p:cTn>
                                         <p:tgtEl>
+                                          <p:spTgt spid="45"/>
+                                        </p:tgtEl>
+                                        <p:attrNameLst>
+                                          <p:attrName>style.visibility</p:attrName>
+                                        </p:attrNameLst>
+                                      </p:cBhvr>
+                                      <p:to>
+                                        <p:strVal val="visible"/>
+                                      </p:to>
+                                    </p:set>
+                                  </p:childTnLst>
+                                </p:cTn>
+                              </p:par>
+                            </p:childTnLst>
+                          </p:cTn>
+                        </p:par>
+                      </p:childTnLst>
+                    </p:cTn>
+                  </p:par>
+                  <p:par>
+                    <p:cTn id="19" fill="hold">
+                      <p:stCondLst>
+                        <p:cond delay="indefinite"/>
+                      </p:stCondLst>
+                      <p:childTnLst>
+                        <p:par>
+                          <p:cTn id="20" fill="hold">
+                            <p:stCondLst>
+                              <p:cond delay="0"/>
+                            </p:stCondLst>
+                            <p:childTnLst>
+                              <p:par>
+                                <p:cTn id="21" presetID="1" presetClass="entr" presetSubtype="0" fill="hold" nodeType="clickEffect">
+                                  <p:stCondLst>
+                                    <p:cond delay="0"/>
+                                  </p:stCondLst>
+                                  <p:childTnLst>
+                                    <p:set>
+                                      <p:cBhvr>
+                                        <p:cTn id="22" dur="1" fill="hold">
+                                          <p:stCondLst>
+                                            <p:cond delay="0"/>
+                                          </p:stCondLst>
+                                        </p:cTn>
+                                        <p:tgtEl>
                                           <p:spTgt spid="41"/>
                                         </p:tgtEl>
                                         <p:attrNameLst>
@@ -5723,14 +5918,14 @@
                                 </p:cTn>
                               </p:par>
                               <p:par>
-                                <p:cTn id="19" presetID="1" presetClass="entr" presetSubtype="0" fill="hold" grpId="0" nodeType="withEffect">
+                                <p:cTn id="23" presetID="1" presetClass="entr" presetSubtype="0" fill="hold" grpId="0" nodeType="withEffect">
                                   <p:stCondLst>
                                     <p:cond delay="0"/>
                                   </p:stCondLst>
                                   <p:childTnLst>
                                     <p:set>
                                       <p:cBhvr>
-                                        <p:cTn id="20" dur="1" fill="hold">
+                                        <p:cTn id="24" dur="1" fill="hold">
                                           <p:stCondLst>
                                             <p:cond delay="0"/>
                                           </p:stCondLst>
@@ -5756,26 +5951,26 @@
                     </p:cTn>
                   </p:par>
                   <p:par>
-                    <p:cTn id="21" fill="hold">
+                    <p:cTn id="25" fill="hold">
                       <p:stCondLst>
                         <p:cond delay="indefinite"/>
                       </p:stCondLst>
                       <p:childTnLst>
                         <p:par>
-                          <p:cTn id="22" fill="hold">
+                          <p:cTn id="26" fill="hold">
                             <p:stCondLst>
                               <p:cond delay="0"/>
                             </p:stCondLst>
                             <p:childTnLst>
                               <p:par>
-                                <p:cTn id="23" presetID="1" presetClass="entr" presetSubtype="0" fill="hold" nodeType="clickEffect">
+                                <p:cTn id="27" presetID="1" presetClass="entr" presetSubtype="0" fill="hold" nodeType="clickEffect">
                                   <p:stCondLst>
                                     <p:cond delay="0"/>
                                   </p:stCondLst>
                                   <p:childTnLst>
                                     <p:set>
                                       <p:cBhvr>
-                                        <p:cTn id="24" dur="1" fill="hold">
+                                        <p:cTn id="28" dur="1" fill="hold">
                                           <p:stCondLst>
                                             <p:cond delay="0"/>
                                           </p:stCondLst>
@@ -5795,14 +5990,14 @@
                                 </p:cTn>
                               </p:par>
                               <p:par>
-                                <p:cTn id="25" presetID="1" presetClass="entr" presetSubtype="0" fill="hold" grpId="0" nodeType="withEffect">
+                                <p:cTn id="29" presetID="1" presetClass="entr" presetSubtype="0" fill="hold" grpId="0" nodeType="withEffect">
                                   <p:stCondLst>
                                     <p:cond delay="0"/>
                                   </p:stCondLst>
                                   <p:childTnLst>
                                     <p:set>
                                       <p:cBhvr>
-                                        <p:cTn id="26" dur="1" fill="hold">
+                                        <p:cTn id="30" dur="1" fill="hold">
                                           <p:stCondLst>
                                             <p:cond delay="0"/>
                                           </p:stCondLst>
@@ -5828,26 +6023,26 @@
                     </p:cTn>
                   </p:par>
                   <p:par>
-                    <p:cTn id="27" fill="hold">
+                    <p:cTn id="31" fill="hold">
                       <p:stCondLst>
                         <p:cond delay="indefinite"/>
                       </p:stCondLst>
                       <p:childTnLst>
                         <p:par>
-                          <p:cTn id="28" fill="hold">
+                          <p:cTn id="32" fill="hold">
                             <p:stCondLst>
                               <p:cond delay="0"/>
                             </p:stCondLst>
                             <p:childTnLst>
                               <p:par>
-                                <p:cTn id="29" presetID="1" presetClass="entr" presetSubtype="0" fill="hold" grpId="0" nodeType="clickEffect">
+                                <p:cTn id="33" presetID="1" presetClass="entr" presetSubtype="0" fill="hold" grpId="0" nodeType="clickEffect">
                                   <p:stCondLst>
                                     <p:cond delay="0"/>
                                   </p:stCondLst>
                                   <p:childTnLst>
                                     <p:set>
                                       <p:cBhvr>
-                                        <p:cTn id="30" dur="1" fill="hold">
+                                        <p:cTn id="34" dur="1" fill="hold">
                                           <p:stCondLst>
                                             <p:cond delay="0"/>
                                           </p:stCondLst>
@@ -5894,6 +6089,7 @@
       </p:par>
     </p:tnLst>
     <p:bldLst>
+      <p:bldP spid="33" grpId="0" animBg="1"/>
       <p:bldP spid="44" grpId="0" animBg="1"/>
       <p:bldP spid="38" grpId="0" animBg="1"/>
       <p:bldP spid="40" grpId="0" animBg="1"/>
@@ -6202,161 +6398,47 @@
               </a:p>
             </p:txBody>
           </p:sp>
-          <p:grpSp>
-            <p:nvGrpSpPr>
-              <p:cNvPr id="11" name="Group 10"/>
-              <p:cNvGrpSpPr/>
+          <p:cxnSp>
+            <p:nvCxnSpPr>
+              <p:cNvPr id="15" name="Straight Connector 14"/>
+              <p:cNvCxnSpPr>
+                <a:stCxn id="33" idx="1"/>
+                <a:endCxn id="31" idx="2"/>
+              </p:cNvCxnSpPr>
               <p:nvPr/>
-            </p:nvGrpSpPr>
-            <p:grpSpPr>
-              <a:xfrm>
-                <a:off x="1143000" y="4038600"/>
-                <a:ext cx="2895600" cy="1170801"/>
-                <a:chOff x="1143000" y="4937593"/>
-                <a:chExt cx="2895600" cy="1170801"/>
+            </p:nvCxnSpPr>
+            <p:spPr>
+              <a:xfrm rot="10800000">
+                <a:off x="2419350" y="4708782"/>
+                <a:ext cx="628650" cy="368354"/>
               </a:xfrm>
-            </p:grpSpPr>
-            <p:sp>
-              <p:nvSpPr>
-                <p:cNvPr id="13" name="TextBox 12"/>
-                <p:cNvSpPr txBox="1"/>
-                <p:nvPr/>
-              </p:nvSpPr>
-              <p:spPr>
-                <a:xfrm>
-                  <a:off x="1981200" y="4937593"/>
-                  <a:ext cx="1447800" cy="369332"/>
-                </a:xfrm>
-                <a:prstGeom prst="rect">
-                  <a:avLst/>
-                </a:prstGeom>
-                <a:noFill/>
-              </p:spPr>
-              <p:txBody>
-                <a:bodyPr wrap="square" rtlCol="0">
-                  <a:spAutoFit/>
-                </a:bodyPr>
-                <a:lstStyle/>
-                <a:p>
-                  <a:r>
-                    <a:rPr lang="en-US" dirty="0" smtClean="0"/>
-                    <a:t>{ “x” : </a:t>
-                  </a:r>
-                  <a:r>
-                    <a:rPr lang="en-US" dirty="0" err="1" smtClean="0"/>
-                    <a:t>int</a:t>
-                  </a:r>
-                  <a:r>
-                    <a:rPr lang="en-US" dirty="0" smtClean="0"/>
-                    <a:t> }</a:t>
-                  </a:r>
-                  <a:endParaRPr lang="en-US" dirty="0"/>
-                </a:p>
-              </p:txBody>
-            </p:sp>
-            <p:sp>
-              <p:nvSpPr>
-                <p:cNvPr id="14" name="TextBox 13"/>
-                <p:cNvSpPr txBox="1"/>
-                <p:nvPr/>
-              </p:nvSpPr>
-              <p:spPr>
-                <a:xfrm>
-                  <a:off x="1143000" y="5739062"/>
-                  <a:ext cx="2895600" cy="369332"/>
-                </a:xfrm>
-                <a:prstGeom prst="rect">
-                  <a:avLst/>
-                </a:prstGeom>
-                <a:noFill/>
-              </p:spPr>
-              <p:txBody>
-                <a:bodyPr wrap="square" rtlCol="0">
-                  <a:spAutoFit/>
-                </a:bodyPr>
-                <a:lstStyle/>
-                <a:p>
-                  <a:r>
-                    <a:rPr lang="en-US" dirty="0" smtClean="0"/>
-                    <a:t>{ “foo” : </a:t>
-                  </a:r>
-                  <a:r>
-                    <a:rPr lang="en-US" dirty="0" err="1" smtClean="0"/>
-                    <a:t>Func</a:t>
-                  </a:r>
-                  <a:r>
-                    <a:rPr lang="en-US" dirty="0" smtClean="0"/>
-                    <a:t>&lt;</a:t>
-                  </a:r>
-                  <a:r>
-                    <a:rPr lang="en-US" dirty="0" err="1" smtClean="0"/>
-                    <a:t>int</a:t>
-                  </a:r>
-                  <a:r>
-                    <a:rPr lang="en-US" dirty="0" smtClean="0"/>
-                    <a:t>, </a:t>
-                  </a:r>
-                  <a:r>
-                    <a:rPr lang="en-US" dirty="0" err="1" smtClean="0"/>
-                    <a:t>int</a:t>
-                  </a:r>
-                  <a:r>
-                    <a:rPr lang="en-US" dirty="0" smtClean="0"/>
-                    <a:t>, </a:t>
-                  </a:r>
-                  <a:r>
-                    <a:rPr lang="en-US" dirty="0" err="1" smtClean="0"/>
-                    <a:t>bool</a:t>
-                  </a:r>
-                  <a:r>
-                    <a:rPr lang="en-US" dirty="0" smtClean="0"/>
-                    <a:t>&gt; }</a:t>
-                  </a:r>
-                  <a:endParaRPr lang="en-US" dirty="0"/>
-                </a:p>
-              </p:txBody>
-            </p:sp>
-            <p:cxnSp>
-              <p:nvCxnSpPr>
-                <p:cNvPr id="15" name="Straight Connector 14"/>
-                <p:cNvCxnSpPr>
-                  <a:endCxn id="14" idx="0"/>
-                </p:cNvCxnSpPr>
-                <p:nvPr/>
-              </p:nvCxnSpPr>
-              <p:spPr>
-                <a:xfrm>
-                  <a:off x="2590800" y="5306925"/>
-                  <a:ext cx="0" cy="432137"/>
-                </a:xfrm>
-                <a:prstGeom prst="line">
-                  <a:avLst/>
-                </a:prstGeom>
-                <a:ln w="28575">
-                  <a:solidFill>
-                    <a:schemeClr val="accent1">
-                      <a:lumMod val="75000"/>
-                    </a:schemeClr>
-                  </a:solidFill>
-                  <a:tailEnd type="triangle"/>
-                </a:ln>
-              </p:spPr>
-              <p:style>
-                <a:lnRef idx="1">
-                  <a:schemeClr val="accent1"/>
-                </a:lnRef>
-                <a:fillRef idx="0">
-                  <a:schemeClr val="accent1"/>
-                </a:fillRef>
-                <a:effectRef idx="0">
-                  <a:schemeClr val="accent1"/>
-                </a:effectRef>
-                <a:fontRef idx="minor">
-                  <a:schemeClr val="tx1"/>
-                </a:fontRef>
-              </p:style>
-            </p:cxnSp>
-          </p:grpSp>
+              <a:prstGeom prst="curvedConnector2">
+                <a:avLst/>
+              </a:prstGeom>
+              <a:ln w="28575">
+                <a:solidFill>
+                  <a:schemeClr val="accent1">
+                    <a:lumMod val="75000"/>
+                  </a:schemeClr>
+                </a:solidFill>
+                <a:tailEnd type="triangle"/>
+              </a:ln>
+            </p:spPr>
+            <p:style>
+              <a:lnRef idx="1">
+                <a:schemeClr val="accent1"/>
+              </a:lnRef>
+              <a:fillRef idx="0">
+                <a:schemeClr val="accent1"/>
+              </a:fillRef>
+              <a:effectRef idx="0">
+                <a:schemeClr val="accent1"/>
+              </a:effectRef>
+              <a:fontRef idx="minor">
+                <a:schemeClr val="tx1"/>
+              </a:fontRef>
+            </p:style>
+          </p:cxnSp>
         </p:grpSp>
         <p:sp>
           <p:nvSpPr>
@@ -6941,6 +7023,199 @@
           </a:fontRef>
         </p:style>
       </p:cxnSp>
+      <p:sp>
+        <p:nvSpPr>
+          <p:cNvPr id="31" name="Rectangle 30"/>
+          <p:cNvSpPr/>
+          <p:nvPr/>
+        </p:nvSpPr>
+        <p:spPr>
+          <a:xfrm>
+            <a:off x="571500" y="3220019"/>
+            <a:ext cx="2476500" cy="574363"/>
+          </a:xfrm>
+          <a:prstGeom prst="rect">
+            <a:avLst/>
+          </a:prstGeom>
+          <a:solidFill>
+            <a:schemeClr val="bg1"/>
+          </a:solidFill>
+        </p:spPr>
+        <p:style>
+          <a:lnRef idx="2">
+            <a:schemeClr val="accent1">
+              <a:shade val="50000"/>
+            </a:schemeClr>
+          </a:lnRef>
+          <a:fillRef idx="1">
+            <a:schemeClr val="accent1"/>
+          </a:fillRef>
+          <a:effectRef idx="0">
+            <a:schemeClr val="accent1"/>
+          </a:effectRef>
+          <a:fontRef idx="minor">
+            <a:schemeClr val="lt1"/>
+          </a:fontRef>
+        </p:style>
+        <p:txBody>
+          <a:bodyPr rtlCol="0" anchor="ctr"/>
+          <a:lstStyle/>
+          <a:p>
+            <a:pPr algn="ctr"/>
+            <a:r>
+              <a:rPr lang="en-US" u="sng" dirty="0" err="1" smtClean="0">
+                <a:solidFill>
+                  <a:schemeClr val="tx1"/>
+                </a:solidFill>
+              </a:rPr>
+              <a:t>Globals</a:t>
+            </a:r>
+            <a:endParaRPr lang="en-US" u="sng" dirty="0" smtClean="0">
+              <a:solidFill>
+                <a:schemeClr val="tx1"/>
+              </a:solidFill>
+            </a:endParaRPr>
+          </a:p>
+          <a:p>
+            <a:pPr algn="ctr"/>
+            <a:r>
+              <a:rPr lang="en-US" dirty="0" smtClean="0">
+                <a:solidFill>
+                  <a:schemeClr val="tx1"/>
+                </a:solidFill>
+              </a:rPr>
+              <a:t>foo: </a:t>
+            </a:r>
+            <a:r>
+              <a:rPr lang="en-US" dirty="0" err="1">
+                <a:solidFill>
+                  <a:schemeClr val="tx1"/>
+                </a:solidFill>
+              </a:rPr>
+              <a:t>Func</a:t>
+            </a:r>
+            <a:r>
+              <a:rPr lang="en-US" dirty="0">
+                <a:solidFill>
+                  <a:schemeClr val="tx1"/>
+                </a:solidFill>
+              </a:rPr>
+              <a:t>&lt;</a:t>
+            </a:r>
+            <a:r>
+              <a:rPr lang="en-US" dirty="0" err="1">
+                <a:solidFill>
+                  <a:schemeClr val="tx1"/>
+                </a:solidFill>
+              </a:rPr>
+              <a:t>int</a:t>
+            </a:r>
+            <a:r>
+              <a:rPr lang="en-US" dirty="0">
+                <a:solidFill>
+                  <a:schemeClr val="tx1"/>
+                </a:solidFill>
+              </a:rPr>
+              <a:t>, </a:t>
+            </a:r>
+            <a:r>
+              <a:rPr lang="en-US" dirty="0" err="1">
+                <a:solidFill>
+                  <a:schemeClr val="tx1"/>
+                </a:solidFill>
+              </a:rPr>
+              <a:t>int</a:t>
+            </a:r>
+            <a:r>
+              <a:rPr lang="en-US" dirty="0">
+                <a:solidFill>
+                  <a:schemeClr val="tx1"/>
+                </a:solidFill>
+              </a:rPr>
+              <a:t>, </a:t>
+            </a:r>
+            <a:r>
+              <a:rPr lang="en-US" dirty="0" err="1">
+                <a:solidFill>
+                  <a:schemeClr val="tx1"/>
+                </a:solidFill>
+              </a:rPr>
+              <a:t>bool</a:t>
+            </a:r>
+            <a:r>
+              <a:rPr lang="en-US" dirty="0">
+                <a:solidFill>
+                  <a:schemeClr val="tx1"/>
+                </a:solidFill>
+              </a:rPr>
+              <a:t>&gt;</a:t>
+            </a:r>
+          </a:p>
+        </p:txBody>
+      </p:sp>
+      <p:sp>
+        <p:nvSpPr>
+          <p:cNvPr id="33" name="Rectangle 32"/>
+          <p:cNvSpPr/>
+          <p:nvPr/>
+        </p:nvSpPr>
+        <p:spPr>
+          <a:xfrm>
+            <a:off x="2438400" y="3985019"/>
+            <a:ext cx="762000" cy="355433"/>
+          </a:xfrm>
+          <a:prstGeom prst="rect">
+            <a:avLst/>
+          </a:prstGeom>
+          <a:solidFill>
+            <a:schemeClr val="bg1"/>
+          </a:solidFill>
+        </p:spPr>
+        <p:style>
+          <a:lnRef idx="2">
+            <a:schemeClr val="accent1">
+              <a:shade val="50000"/>
+            </a:schemeClr>
+          </a:lnRef>
+          <a:fillRef idx="1">
+            <a:schemeClr val="accent1"/>
+          </a:fillRef>
+          <a:effectRef idx="0">
+            <a:schemeClr val="accent1"/>
+          </a:effectRef>
+          <a:fontRef idx="minor">
+            <a:schemeClr val="lt1"/>
+          </a:fontRef>
+        </p:style>
+        <p:txBody>
+          <a:bodyPr rtlCol="0" anchor="ctr"/>
+          <a:lstStyle/>
+          <a:p>
+            <a:pPr algn="ctr"/>
+            <a:r>
+              <a:rPr lang="en-US" dirty="0" smtClean="0">
+                <a:solidFill>
+                  <a:schemeClr val="tx1"/>
+                </a:solidFill>
+              </a:rPr>
+              <a:t>x: </a:t>
+            </a:r>
+            <a:r>
+              <a:rPr lang="en-US" dirty="0" err="1" smtClean="0">
+                <a:solidFill>
+                  <a:schemeClr val="tx1"/>
+                </a:solidFill>
+              </a:rPr>
+              <a:t>int</a:t>
+            </a:r>
+            <a:endParaRPr lang="en-US" dirty="0">
+              <a:solidFill>
+                <a:schemeClr val="tx1"/>
+              </a:solidFill>
+            </a:endParaRPr>
+          </a:p>
+        </p:txBody>
+      </p:sp>
     </p:spTree>
     <p:extLst>
       <p:ext uri="{BB962C8B-B14F-4D97-AF65-F5344CB8AC3E}">

</xml_diff>